<commit_message>
Make plot lines thicker and recompile results
</commit_message>
<xml_diff>
--- a/poster/images/malaria_model_dynamics.pptx
+++ b/poster/images/malaria_model_dynamics.pptx
@@ -6,6 +6,7 @@
   </p:sldMasterIdLst>
   <p:sldIdLst>
     <p:sldId id="256" r:id="rId2"/>
+    <p:sldId id="257" r:id="rId3"/>
   </p:sldIdLst>
   <p:sldSz cx="12192000" cy="6858000"/>
   <p:notesSz cx="6858000" cy="9144000"/>
@@ -104,7 +105,280 @@
       </a:defRPr>
     </a:lvl9pPr>
   </p:defaultTextStyle>
+  <p:extLst>
+    <p:ext uri="{EFAFB233-063F-42B5-8137-9DF3F51BA10A}">
+      <p15:sldGuideLst xmlns:p15="http://schemas.microsoft.com/office/powerpoint/2012/main"/>
+    </p:ext>
+  </p:extLst>
 </p:presentation>
+</file>
+
+<file path=ppt/revisionInfo.xml><?xml version="1.0" encoding="utf-8"?>
+<p1510:revInfo xmlns:a="http://schemas.openxmlformats.org/drawingml/2006/main" xmlns:r="http://schemas.openxmlformats.org/officeDocument/2006/relationships" xmlns:p1510="http://schemas.microsoft.com/office/powerpoint/2015/10/main">
+  <p1510:revLst>
+    <p1510:client id="{675773DB-9DEB-4D5A-BFDB-6E158F58B5E6}" v="1" dt="2025-01-30T03:33:30.691"/>
+  </p1510:revLst>
+</p1510:revInfo>
+</file>
+
+<file path=ppt/changesInfos/changesInfo1.xml><?xml version="1.0" encoding="utf-8"?>
+<pc:chgInfo xmlns:a="http://schemas.openxmlformats.org/drawingml/2006/main" xmlns:r="http://schemas.openxmlformats.org/officeDocument/2006/relationships" xmlns:ac="http://schemas.microsoft.com/office/drawing/2013/main/command" xmlns:pc="http://schemas.microsoft.com/office/powerpoint/2013/main/command">
+  <pc:docChgLst>
+    <pc:chgData name="Owen Personal" userId="50503bb1a9159eff" providerId="LiveId" clId="{675773DB-9DEB-4D5A-BFDB-6E158F58B5E6}"/>
+    <pc:docChg chg="undo custSel addSld modSld">
+      <pc:chgData name="Owen Personal" userId="50503bb1a9159eff" providerId="LiveId" clId="{675773DB-9DEB-4D5A-BFDB-6E158F58B5E6}" dt="2025-01-30T04:35:41.446" v="36" actId="767"/>
+      <pc:docMkLst>
+        <pc:docMk/>
+      </pc:docMkLst>
+      <pc:sldChg chg="addSp delSp modSp mod">
+        <pc:chgData name="Owen Personal" userId="50503bb1a9159eff" providerId="LiveId" clId="{675773DB-9DEB-4D5A-BFDB-6E158F58B5E6}" dt="2025-01-30T03:36:16.125" v="29" actId="12788"/>
+        <pc:sldMkLst>
+          <pc:docMk/>
+          <pc:sldMk cId="3991404153" sldId="256"/>
+        </pc:sldMkLst>
+        <pc:spChg chg="mod topLvl">
+          <ac:chgData name="Owen Personal" userId="50503bb1a9159eff" providerId="LiveId" clId="{675773DB-9DEB-4D5A-BFDB-6E158F58B5E6}" dt="2025-01-30T03:34:43.451" v="9" actId="164"/>
+          <ac:spMkLst>
+            <pc:docMk/>
+            <pc:sldMk cId="3991404153" sldId="256"/>
+            <ac:spMk id="13" creationId="{12DD2E35-DE66-8B8D-4B5E-CFEE6E899F7C}"/>
+          </ac:spMkLst>
+        </pc:spChg>
+        <pc:spChg chg="mod topLvl">
+          <ac:chgData name="Owen Personal" userId="50503bb1a9159eff" providerId="LiveId" clId="{675773DB-9DEB-4D5A-BFDB-6E158F58B5E6}" dt="2025-01-30T03:35:00.854" v="13" actId="164"/>
+          <ac:spMkLst>
+            <pc:docMk/>
+            <pc:sldMk cId="3991404153" sldId="256"/>
+            <ac:spMk id="15" creationId="{3500E062-4AD8-E534-759C-E6F5161FD695}"/>
+          </ac:spMkLst>
+        </pc:spChg>
+        <pc:spChg chg="mod topLvl">
+          <ac:chgData name="Owen Personal" userId="50503bb1a9159eff" providerId="LiveId" clId="{675773DB-9DEB-4D5A-BFDB-6E158F58B5E6}" dt="2025-01-30T03:35:14.102" v="17" actId="164"/>
+          <ac:spMkLst>
+            <pc:docMk/>
+            <pc:sldMk cId="3991404153" sldId="256"/>
+            <ac:spMk id="17" creationId="{9CA5B178-DF51-5B4C-0896-73BE1332C12E}"/>
+          </ac:spMkLst>
+        </pc:spChg>
+        <pc:spChg chg="mod topLvl">
+          <ac:chgData name="Owen Personal" userId="50503bb1a9159eff" providerId="LiveId" clId="{675773DB-9DEB-4D5A-BFDB-6E158F58B5E6}" dt="2025-01-30T03:35:29.069" v="21" actId="164"/>
+          <ac:spMkLst>
+            <pc:docMk/>
+            <pc:sldMk cId="3991404153" sldId="256"/>
+            <ac:spMk id="18" creationId="{5772BB63-ECC9-8B53-77BB-6FD8D10F3FBB}"/>
+          </ac:spMkLst>
+        </pc:spChg>
+        <pc:spChg chg="mod topLvl">
+          <ac:chgData name="Owen Personal" userId="50503bb1a9159eff" providerId="LiveId" clId="{675773DB-9DEB-4D5A-BFDB-6E158F58B5E6}" dt="2025-01-30T03:34:43.451" v="9" actId="164"/>
+          <ac:spMkLst>
+            <pc:docMk/>
+            <pc:sldMk cId="3991404153" sldId="256"/>
+            <ac:spMk id="46" creationId="{B6467226-C66C-6ED2-0010-A0C8504EA3E0}"/>
+          </ac:spMkLst>
+        </pc:spChg>
+        <pc:spChg chg="mod topLvl">
+          <ac:chgData name="Owen Personal" userId="50503bb1a9159eff" providerId="LiveId" clId="{675773DB-9DEB-4D5A-BFDB-6E158F58B5E6}" dt="2025-01-30T03:35:00.854" v="13" actId="164"/>
+          <ac:spMkLst>
+            <pc:docMk/>
+            <pc:sldMk cId="3991404153" sldId="256"/>
+            <ac:spMk id="47" creationId="{2F408082-AB4D-DB42-CC5D-97BE09356EB5}"/>
+          </ac:spMkLst>
+        </pc:spChg>
+        <pc:spChg chg="mod topLvl">
+          <ac:chgData name="Owen Personal" userId="50503bb1a9159eff" providerId="LiveId" clId="{675773DB-9DEB-4D5A-BFDB-6E158F58B5E6}" dt="2025-01-30T03:35:14.102" v="17" actId="164"/>
+          <ac:spMkLst>
+            <pc:docMk/>
+            <pc:sldMk cId="3991404153" sldId="256"/>
+            <ac:spMk id="50" creationId="{4078D23B-F66A-72D5-55D4-95BCF7D05F59}"/>
+          </ac:spMkLst>
+        </pc:spChg>
+        <pc:spChg chg="mod topLvl">
+          <ac:chgData name="Owen Personal" userId="50503bb1a9159eff" providerId="LiveId" clId="{675773DB-9DEB-4D5A-BFDB-6E158F58B5E6}" dt="2025-01-30T03:35:29.069" v="21" actId="164"/>
+          <ac:spMkLst>
+            <pc:docMk/>
+            <pc:sldMk cId="3991404153" sldId="256"/>
+            <ac:spMk id="53" creationId="{AECA0030-50E1-9080-FA4F-03499D6CF741}"/>
+          </ac:spMkLst>
+        </pc:spChg>
+        <pc:spChg chg="mod">
+          <ac:chgData name="Owen Personal" userId="50503bb1a9159eff" providerId="LiveId" clId="{675773DB-9DEB-4D5A-BFDB-6E158F58B5E6}" dt="2025-01-30T03:36:16.125" v="29" actId="12788"/>
+          <ac:spMkLst>
+            <pc:docMk/>
+            <pc:sldMk cId="3991404153" sldId="256"/>
+            <ac:spMk id="55" creationId="{0569DABC-C173-04E7-7AC5-79626E0C5CDF}"/>
+          </ac:spMkLst>
+        </pc:spChg>
+        <pc:spChg chg="mod">
+          <ac:chgData name="Owen Personal" userId="50503bb1a9159eff" providerId="LiveId" clId="{675773DB-9DEB-4D5A-BFDB-6E158F58B5E6}" dt="2025-01-30T03:35:57.574" v="27" actId="554"/>
+          <ac:spMkLst>
+            <pc:docMk/>
+            <pc:sldMk cId="3991404153" sldId="256"/>
+            <ac:spMk id="56" creationId="{79BCBB04-3DB7-3EB2-5F21-4FAEFA285853}"/>
+          </ac:spMkLst>
+        </pc:spChg>
+        <pc:spChg chg="mod">
+          <ac:chgData name="Owen Personal" userId="50503bb1a9159eff" providerId="LiveId" clId="{675773DB-9DEB-4D5A-BFDB-6E158F58B5E6}" dt="2025-01-30T03:35:33.418" v="22" actId="1076"/>
+          <ac:spMkLst>
+            <pc:docMk/>
+            <pc:sldMk cId="3991404153" sldId="256"/>
+            <ac:spMk id="57" creationId="{C69E4B3D-7207-2AD7-C0BA-5141346C70A8}"/>
+          </ac:spMkLst>
+        </pc:spChg>
+        <pc:spChg chg="mod">
+          <ac:chgData name="Owen Personal" userId="50503bb1a9159eff" providerId="LiveId" clId="{675773DB-9DEB-4D5A-BFDB-6E158F58B5E6}" dt="2025-01-30T03:35:57.574" v="27" actId="554"/>
+          <ac:spMkLst>
+            <pc:docMk/>
+            <pc:sldMk cId="3991404153" sldId="256"/>
+            <ac:spMk id="58" creationId="{CC072C24-008D-D6DC-FDA6-4211AA104BFC}"/>
+          </ac:spMkLst>
+        </pc:spChg>
+        <pc:spChg chg="mod">
+          <ac:chgData name="Owen Personal" userId="50503bb1a9159eff" providerId="LiveId" clId="{675773DB-9DEB-4D5A-BFDB-6E158F58B5E6}" dt="2025-01-30T03:35:37.473" v="23" actId="1076"/>
+          <ac:spMkLst>
+            <pc:docMk/>
+            <pc:sldMk cId="3991404153" sldId="256"/>
+            <ac:spMk id="59" creationId="{B1EDBA67-F5F7-F149-F2D0-EEF54A952E94}"/>
+          </ac:spMkLst>
+        </pc:spChg>
+        <pc:spChg chg="mod">
+          <ac:chgData name="Owen Personal" userId="50503bb1a9159eff" providerId="LiveId" clId="{675773DB-9DEB-4D5A-BFDB-6E158F58B5E6}" dt="2025-01-30T03:33:36.361" v="1" actId="1076"/>
+          <ac:spMkLst>
+            <pc:docMk/>
+            <pc:sldMk cId="3991404153" sldId="256"/>
+            <ac:spMk id="60" creationId="{FBDDAF41-0DAD-3B40-B716-91A5B376687B}"/>
+          </ac:spMkLst>
+        </pc:spChg>
+        <pc:spChg chg="mod">
+          <ac:chgData name="Owen Personal" userId="50503bb1a9159eff" providerId="LiveId" clId="{675773DB-9DEB-4D5A-BFDB-6E158F58B5E6}" dt="2025-01-30T03:33:30.690" v="0" actId="255"/>
+          <ac:spMkLst>
+            <pc:docMk/>
+            <pc:sldMk cId="3991404153" sldId="256"/>
+            <ac:spMk id="62" creationId="{E5878D8B-8A94-3E6D-5ECB-B2523CA80CC0}"/>
+          </ac:spMkLst>
+        </pc:spChg>
+        <pc:grpChg chg="add mod">
+          <ac:chgData name="Owen Personal" userId="50503bb1a9159eff" providerId="LiveId" clId="{675773DB-9DEB-4D5A-BFDB-6E158F58B5E6}" dt="2025-01-30T03:34:43.451" v="9" actId="164"/>
+          <ac:grpSpMkLst>
+            <pc:docMk/>
+            <pc:sldMk cId="3991404153" sldId="256"/>
+            <ac:grpSpMk id="2" creationId="{7D8AD4D7-E76A-D73E-CB1A-9E4D565F966F}"/>
+          </ac:grpSpMkLst>
+        </pc:grpChg>
+        <pc:grpChg chg="add mod">
+          <ac:chgData name="Owen Personal" userId="50503bb1a9159eff" providerId="LiveId" clId="{675773DB-9DEB-4D5A-BFDB-6E158F58B5E6}" dt="2025-01-30T03:36:16.125" v="29" actId="12788"/>
+          <ac:grpSpMkLst>
+            <pc:docMk/>
+            <pc:sldMk cId="3991404153" sldId="256"/>
+            <ac:grpSpMk id="3" creationId="{00A5AEB3-6BE3-77E9-CA94-0610AA38EF1E}"/>
+          </ac:grpSpMkLst>
+        </pc:grpChg>
+        <pc:grpChg chg="add mod">
+          <ac:chgData name="Owen Personal" userId="50503bb1a9159eff" providerId="LiveId" clId="{675773DB-9DEB-4D5A-BFDB-6E158F58B5E6}" dt="2025-01-30T03:35:14.102" v="17" actId="164"/>
+          <ac:grpSpMkLst>
+            <pc:docMk/>
+            <pc:sldMk cId="3991404153" sldId="256"/>
+            <ac:grpSpMk id="4" creationId="{21F160A3-E31C-974B-29BC-CC25B2955E6D}"/>
+          </ac:grpSpMkLst>
+        </pc:grpChg>
+        <pc:grpChg chg="add mod">
+          <ac:chgData name="Owen Personal" userId="50503bb1a9159eff" providerId="LiveId" clId="{675773DB-9DEB-4D5A-BFDB-6E158F58B5E6}" dt="2025-01-30T03:35:29.069" v="21" actId="164"/>
+          <ac:grpSpMkLst>
+            <pc:docMk/>
+            <pc:sldMk cId="3991404153" sldId="256"/>
+            <ac:grpSpMk id="5" creationId="{EFA9D866-409B-1CBB-E707-95A4D13ED264}"/>
+          </ac:grpSpMkLst>
+        </pc:grpChg>
+        <pc:grpChg chg="del mod">
+          <ac:chgData name="Owen Personal" userId="50503bb1a9159eff" providerId="LiveId" clId="{675773DB-9DEB-4D5A-BFDB-6E158F58B5E6}" dt="2025-01-30T03:34:09.367" v="6" actId="165"/>
+          <ac:grpSpMkLst>
+            <pc:docMk/>
+            <pc:sldMk cId="3991404153" sldId="256"/>
+            <ac:grpSpMk id="48" creationId="{9C280294-74FC-B390-63E7-3205CFC9992A}"/>
+          </ac:grpSpMkLst>
+        </pc:grpChg>
+        <pc:grpChg chg="del">
+          <ac:chgData name="Owen Personal" userId="50503bb1a9159eff" providerId="LiveId" clId="{675773DB-9DEB-4D5A-BFDB-6E158F58B5E6}" dt="2025-01-30T03:34:49.948" v="10" actId="165"/>
+          <ac:grpSpMkLst>
+            <pc:docMk/>
+            <pc:sldMk cId="3991404153" sldId="256"/>
+            <ac:grpSpMk id="49" creationId="{9D994021-A642-2FD7-F553-CBE253BED372}"/>
+          </ac:grpSpMkLst>
+        </pc:grpChg>
+        <pc:grpChg chg="del">
+          <ac:chgData name="Owen Personal" userId="50503bb1a9159eff" providerId="LiveId" clId="{675773DB-9DEB-4D5A-BFDB-6E158F58B5E6}" dt="2025-01-30T03:35:04.645" v="14" actId="165"/>
+          <ac:grpSpMkLst>
+            <pc:docMk/>
+            <pc:sldMk cId="3991404153" sldId="256"/>
+            <ac:grpSpMk id="51" creationId="{4B0A7A1F-B05B-208C-0178-B7EFD52DC1CF}"/>
+          </ac:grpSpMkLst>
+        </pc:grpChg>
+        <pc:grpChg chg="del">
+          <ac:chgData name="Owen Personal" userId="50503bb1a9159eff" providerId="LiveId" clId="{675773DB-9DEB-4D5A-BFDB-6E158F58B5E6}" dt="2025-01-30T03:35:20.242" v="18" actId="165"/>
+          <ac:grpSpMkLst>
+            <pc:docMk/>
+            <pc:sldMk cId="3991404153" sldId="256"/>
+            <ac:grpSpMk id="54" creationId="{63CF0BCD-7E37-E1FC-8F84-5E11F5A1A9DC}"/>
+          </ac:grpSpMkLst>
+        </pc:grpChg>
+        <pc:cxnChg chg="mod">
+          <ac:chgData name="Owen Personal" userId="50503bb1a9159eff" providerId="LiveId" clId="{675773DB-9DEB-4D5A-BFDB-6E158F58B5E6}" dt="2025-01-30T03:34:39.498" v="8" actId="12789"/>
+          <ac:cxnSpMkLst>
+            <pc:docMk/>
+            <pc:sldMk cId="3991404153" sldId="256"/>
+            <ac:cxnSpMk id="25" creationId="{0ABD87E5-2B41-F817-4A8D-D0DFD35427ED}"/>
+          </ac:cxnSpMkLst>
+        </pc:cxnChg>
+        <pc:cxnChg chg="mod">
+          <ac:chgData name="Owen Personal" userId="50503bb1a9159eff" providerId="LiveId" clId="{675773DB-9DEB-4D5A-BFDB-6E158F58B5E6}" dt="2025-01-30T03:36:16.125" v="29" actId="12788"/>
+          <ac:cxnSpMkLst>
+            <pc:docMk/>
+            <pc:sldMk cId="3991404153" sldId="256"/>
+            <ac:cxnSpMk id="26" creationId="{322D5CEF-DEF0-B407-D37F-FBD453756131}"/>
+          </ac:cxnSpMkLst>
+        </pc:cxnChg>
+        <pc:cxnChg chg="mod">
+          <ac:chgData name="Owen Personal" userId="50503bb1a9159eff" providerId="LiveId" clId="{675773DB-9DEB-4D5A-BFDB-6E158F58B5E6}" dt="2025-01-30T03:35:26.334" v="20" actId="12789"/>
+          <ac:cxnSpMkLst>
+            <pc:docMk/>
+            <pc:sldMk cId="3991404153" sldId="256"/>
+            <ac:cxnSpMk id="30" creationId="{E46DCB94-E083-67CC-DADD-C376FE2F3DB2}"/>
+          </ac:cxnSpMkLst>
+        </pc:cxnChg>
+        <pc:cxnChg chg="mod">
+          <ac:chgData name="Owen Personal" userId="50503bb1a9159eff" providerId="LiveId" clId="{675773DB-9DEB-4D5A-BFDB-6E158F58B5E6}" dt="2025-01-30T03:34:39.498" v="8" actId="12789"/>
+          <ac:cxnSpMkLst>
+            <pc:docMk/>
+            <pc:sldMk cId="3991404153" sldId="256"/>
+            <ac:cxnSpMk id="42" creationId="{74B00698-1847-F245-4D50-43CF3439C22D}"/>
+          </ac:cxnSpMkLst>
+        </pc:cxnChg>
+      </pc:sldChg>
+      <pc:sldChg chg="addSp modSp new mod">
+        <pc:chgData name="Owen Personal" userId="50503bb1a9159eff" providerId="LiveId" clId="{675773DB-9DEB-4D5A-BFDB-6E158F58B5E6}" dt="2025-01-30T04:35:41.446" v="36" actId="767"/>
+        <pc:sldMkLst>
+          <pc:docMk/>
+          <pc:sldMk cId="2685355263" sldId="257"/>
+        </pc:sldMkLst>
+        <pc:spChg chg="add mod">
+          <ac:chgData name="Owen Personal" userId="50503bb1a9159eff" providerId="LiveId" clId="{675773DB-9DEB-4D5A-BFDB-6E158F58B5E6}" dt="2025-01-30T04:35:41.446" v="36" actId="767"/>
+          <ac:spMkLst>
+            <pc:docMk/>
+            <pc:sldMk cId="2685355263" sldId="257"/>
+            <ac:spMk id="4" creationId="{50DFE4D2-2CA9-154A-CF97-79E7B53F5FDC}"/>
+          </ac:spMkLst>
+        </pc:spChg>
+        <pc:picChg chg="add mod">
+          <ac:chgData name="Owen Personal" userId="50503bb1a9159eff" providerId="LiveId" clId="{675773DB-9DEB-4D5A-BFDB-6E158F58B5E6}" dt="2025-01-30T04:07:29.506" v="35" actId="14100"/>
+          <ac:picMkLst>
+            <pc:docMk/>
+            <pc:sldMk cId="2685355263" sldId="257"/>
+            <ac:picMk id="3" creationId="{0F7ABE44-E086-7705-2A18-E146CFEB987D}"/>
+          </ac:picMkLst>
+        </pc:picChg>
+      </pc:sldChg>
+    </pc:docChg>
+  </pc:docChgLst>
+</pc:chgInfo>
 </file>
 
 <file path=ppt/slideLayouts/slideLayout1.xml><?xml version="1.0" encoding="utf-8"?>
@@ -254,7 +528,7 @@
           <a:p>
             <a:fld id="{02DC9201-E925-461F-9DDB-45DC77C89B80}" type="datetimeFigureOut">
               <a:rPr lang="en-US" smtClean="0"/>
-              <a:t>1/21/2025</a:t>
+              <a:t>1/30/2025</a:t>
             </a:fld>
             <a:endParaRPr lang="en-US"/>
           </a:p>
@@ -452,7 +726,7 @@
           <a:p>
             <a:fld id="{02DC9201-E925-461F-9DDB-45DC77C89B80}" type="datetimeFigureOut">
               <a:rPr lang="en-US" smtClean="0"/>
-              <a:t>1/21/2025</a:t>
+              <a:t>1/30/2025</a:t>
             </a:fld>
             <a:endParaRPr lang="en-US"/>
           </a:p>
@@ -660,7 +934,7 @@
           <a:p>
             <a:fld id="{02DC9201-E925-461F-9DDB-45DC77C89B80}" type="datetimeFigureOut">
               <a:rPr lang="en-US" smtClean="0"/>
-              <a:t>1/21/2025</a:t>
+              <a:t>1/30/2025</a:t>
             </a:fld>
             <a:endParaRPr lang="en-US"/>
           </a:p>
@@ -858,7 +1132,7 @@
           <a:p>
             <a:fld id="{02DC9201-E925-461F-9DDB-45DC77C89B80}" type="datetimeFigureOut">
               <a:rPr lang="en-US" smtClean="0"/>
-              <a:t>1/21/2025</a:t>
+              <a:t>1/30/2025</a:t>
             </a:fld>
             <a:endParaRPr lang="en-US"/>
           </a:p>
@@ -1133,7 +1407,7 @@
           <a:p>
             <a:fld id="{02DC9201-E925-461F-9DDB-45DC77C89B80}" type="datetimeFigureOut">
               <a:rPr lang="en-US" smtClean="0"/>
-              <a:t>1/21/2025</a:t>
+              <a:t>1/30/2025</a:t>
             </a:fld>
             <a:endParaRPr lang="en-US"/>
           </a:p>
@@ -1398,7 +1672,7 @@
           <a:p>
             <a:fld id="{02DC9201-E925-461F-9DDB-45DC77C89B80}" type="datetimeFigureOut">
               <a:rPr lang="en-US" smtClean="0"/>
-              <a:t>1/21/2025</a:t>
+              <a:t>1/30/2025</a:t>
             </a:fld>
             <a:endParaRPr lang="en-US"/>
           </a:p>
@@ -1810,7 +2084,7 @@
           <a:p>
             <a:fld id="{02DC9201-E925-461F-9DDB-45DC77C89B80}" type="datetimeFigureOut">
               <a:rPr lang="en-US" smtClean="0"/>
-              <a:t>1/21/2025</a:t>
+              <a:t>1/30/2025</a:t>
             </a:fld>
             <a:endParaRPr lang="en-US"/>
           </a:p>
@@ -1951,7 +2225,7 @@
           <a:p>
             <a:fld id="{02DC9201-E925-461F-9DDB-45DC77C89B80}" type="datetimeFigureOut">
               <a:rPr lang="en-US" smtClean="0"/>
-              <a:t>1/21/2025</a:t>
+              <a:t>1/30/2025</a:t>
             </a:fld>
             <a:endParaRPr lang="en-US"/>
           </a:p>
@@ -2064,7 +2338,7 @@
           <a:p>
             <a:fld id="{02DC9201-E925-461F-9DDB-45DC77C89B80}" type="datetimeFigureOut">
               <a:rPr lang="en-US" smtClean="0"/>
-              <a:t>1/21/2025</a:t>
+              <a:t>1/30/2025</a:t>
             </a:fld>
             <a:endParaRPr lang="en-US"/>
           </a:p>
@@ -2375,7 +2649,7 @@
           <a:p>
             <a:fld id="{02DC9201-E925-461F-9DDB-45DC77C89B80}" type="datetimeFigureOut">
               <a:rPr lang="en-US" smtClean="0"/>
-              <a:t>1/21/2025</a:t>
+              <a:t>1/30/2025</a:t>
             </a:fld>
             <a:endParaRPr lang="en-US"/>
           </a:p>
@@ -2663,7 +2937,7 @@
           <a:p>
             <a:fld id="{02DC9201-E925-461F-9DDB-45DC77C89B80}" type="datetimeFigureOut">
               <a:rPr lang="en-US" smtClean="0"/>
-              <a:t>1/21/2025</a:t>
+              <a:t>1/30/2025</a:t>
             </a:fld>
             <a:endParaRPr lang="en-US"/>
           </a:p>
@@ -2904,7 +3178,7 @@
           <a:p>
             <a:fld id="{02DC9201-E925-461F-9DDB-45DC77C89B80}" type="datetimeFigureOut">
               <a:rPr lang="en-US" smtClean="0"/>
-              <a:t>1/21/2025</a:t>
+              <a:t>1/30/2025</a:t>
             </a:fld>
             <a:endParaRPr lang="en-US"/>
           </a:p>
@@ -3764,10 +4038,10 @@
       </p:cxnSp>
       <p:grpSp>
         <p:nvGrpSpPr>
-          <p:cNvPr id="48" name="Group 47">
-            <a:extLst>
-              <a:ext uri="{FF2B5EF4-FFF2-40B4-BE49-F238E27FC236}">
-                <a16:creationId xmlns:a16="http://schemas.microsoft.com/office/drawing/2014/main" id="{9C280294-74FC-B390-63E7-3205CFC9992A}"/>
+          <p:cNvPr id="2" name="Group 1">
+            <a:extLst>
+              <a:ext uri="{FF2B5EF4-FFF2-40B4-BE49-F238E27FC236}">
+                <a16:creationId xmlns:a16="http://schemas.microsoft.com/office/drawing/2014/main" id="{7D8AD4D7-E76A-D73E-CB1A-9E4D565F966F}"/>
               </a:ext>
             </a:extLst>
           </p:cNvPr>
@@ -3830,7 +4104,7 @@
             <a:lstStyle/>
             <a:p>
               <a:pPr algn="ctr"/>
-              <a:endParaRPr lang="en-US"/>
+              <a:endParaRPr lang="en-US" sz="2400"/>
             </a:p>
           </p:txBody>
         </p:sp>
@@ -3850,8 +4124,8 @@
               </p:nvSpPr>
               <p:spPr>
                 <a:xfrm>
-                  <a:off x="2047197" y="2738434"/>
-                  <a:ext cx="172804" cy="276999"/>
+                  <a:off x="2017574" y="2692267"/>
+                  <a:ext cx="232051" cy="369332"/>
                 </a:xfrm>
                 <a:prstGeom prst="rect">
                   <a:avLst/>
@@ -3864,6 +4138,7 @@
                 </a:bodyPr>
                 <a:lstStyle/>
                 <a:p>
+                  <a:pPr/>
                   <a14:m>
                     <m:oMathPara xmlns:m="http://schemas.openxmlformats.org/officeDocument/2006/math">
                       <m:oMathParaPr>
@@ -3871,7 +4146,7 @@
                       </m:oMathParaPr>
                       <m:oMath xmlns:m="http://schemas.openxmlformats.org/officeDocument/2006/math">
                         <m:r>
-                          <a:rPr lang="en-AU" b="0" i="1" smtClean="0">
+                          <a:rPr lang="en-AU" sz="2400" b="0" i="1" smtClean="0">
                             <a:latin typeface="Cambria Math" panose="02040503050406030204" pitchFamily="18" charset="0"/>
                           </a:rPr>
                           <m:t>𝑆</m:t>
@@ -3879,7 +4154,7 @@
                       </m:oMath>
                     </m:oMathPara>
                   </a14:m>
-                  <a:endParaRPr lang="en-US" dirty="0"/>
+                  <a:endParaRPr lang="en-US" sz="2400" dirty="0"/>
                 </a:p>
               </p:txBody>
             </p:sp>
@@ -3901,8 +4176,8 @@
               </p:nvSpPr>
               <p:spPr>
                 <a:xfrm>
-                  <a:off x="2047197" y="2738434"/>
-                  <a:ext cx="172804" cy="276999"/>
+                  <a:off x="2017574" y="2692267"/>
+                  <a:ext cx="232051" cy="369332"/>
                 </a:xfrm>
                 <a:prstGeom prst="rect">
                   <a:avLst/>
@@ -3910,7 +4185,7 @@
                 <a:blipFill>
                   <a:blip r:embed="rId2"/>
                   <a:stretch>
-                    <a:fillRect l="-35714" r="-32143" b="-6522"/>
+                    <a:fillRect l="-34211" r="-26316" b="-5000"/>
                   </a:stretch>
                 </a:blipFill>
               </p:spPr>
@@ -3932,10 +4207,10 @@
       </p:grpSp>
       <p:grpSp>
         <p:nvGrpSpPr>
-          <p:cNvPr id="49" name="Group 48">
-            <a:extLst>
-              <a:ext uri="{FF2B5EF4-FFF2-40B4-BE49-F238E27FC236}">
-                <a16:creationId xmlns:a16="http://schemas.microsoft.com/office/drawing/2014/main" id="{9D994021-A642-2FD7-F553-CBE253BED372}"/>
+          <p:cNvPr id="3" name="Group 2">
+            <a:extLst>
+              <a:ext uri="{FF2B5EF4-FFF2-40B4-BE49-F238E27FC236}">
+                <a16:creationId xmlns:a16="http://schemas.microsoft.com/office/drawing/2014/main" id="{00A5AEB3-6BE3-77E9-CA94-0610AA38EF1E}"/>
               </a:ext>
             </a:extLst>
           </p:cNvPr>
@@ -3998,7 +4273,7 @@
             <a:lstStyle/>
             <a:p>
               <a:pPr algn="ctr"/>
-              <a:endParaRPr lang="en-US"/>
+              <a:endParaRPr lang="en-US" sz="2400"/>
             </a:p>
           </p:txBody>
         </p:sp>
@@ -4018,8 +4293,8 @@
               </p:nvSpPr>
               <p:spPr>
                 <a:xfrm>
-                  <a:off x="4807736" y="2738434"/>
-                  <a:ext cx="223138" cy="276999"/>
+                  <a:off x="4770803" y="2692267"/>
+                  <a:ext cx="297004" cy="369332"/>
                 </a:xfrm>
                 <a:prstGeom prst="rect">
                   <a:avLst/>
@@ -4032,6 +4307,7 @@
                 </a:bodyPr>
                 <a:lstStyle/>
                 <a:p>
+                  <a:pPr/>
                   <a14:m>
                     <m:oMathPara xmlns:m="http://schemas.openxmlformats.org/officeDocument/2006/math">
                       <m:oMathParaPr>
@@ -4041,14 +4317,14 @@
                         <m:sSub>
                           <m:sSubPr>
                             <m:ctrlPr>
-                              <a:rPr lang="en-AU" b="0" i="1" smtClean="0">
+                              <a:rPr lang="en-AU" sz="2400" b="0" i="1" smtClean="0">
                                 <a:latin typeface="Cambria Math" panose="02040503050406030204" pitchFamily="18" charset="0"/>
                               </a:rPr>
                             </m:ctrlPr>
                           </m:sSubPr>
                           <m:e>
                             <m:r>
-                              <a:rPr lang="en-AU" b="0" i="1" smtClean="0">
+                              <a:rPr lang="en-AU" sz="2400" b="0" i="1" smtClean="0">
                                 <a:latin typeface="Cambria Math" panose="02040503050406030204" pitchFamily="18" charset="0"/>
                               </a:rPr>
                               <m:t>𝐼</m:t>
@@ -4056,7 +4332,7 @@
                           </m:e>
                           <m:sub>
                             <m:r>
-                              <a:rPr lang="en-AU" b="0" i="1" smtClean="0">
+                              <a:rPr lang="en-AU" sz="2400" b="0" i="1" smtClean="0">
                                 <a:latin typeface="Cambria Math" panose="02040503050406030204" pitchFamily="18" charset="0"/>
                               </a:rPr>
                               <m:t>1</m:t>
@@ -4066,7 +4342,7 @@
                       </m:oMath>
                     </m:oMathPara>
                   </a14:m>
-                  <a:endParaRPr lang="en-US" dirty="0"/>
+                  <a:endParaRPr lang="en-US" sz="2400" dirty="0"/>
                 </a:p>
               </p:txBody>
             </p:sp>
@@ -4088,8 +4364,8 @@
               </p:nvSpPr>
               <p:spPr>
                 <a:xfrm>
-                  <a:off x="4807736" y="2738434"/>
-                  <a:ext cx="223138" cy="276999"/>
+                  <a:off x="4770803" y="2692267"/>
+                  <a:ext cx="297004" cy="369332"/>
                 </a:xfrm>
                 <a:prstGeom prst="rect">
                   <a:avLst/>
@@ -4097,7 +4373,7 @@
                 <a:blipFill>
                   <a:blip r:embed="rId3"/>
                   <a:stretch>
-                    <a:fillRect l="-27778" r="-11111" b="-15217"/>
+                    <a:fillRect l="-27083" r="-10417" b="-13333"/>
                   </a:stretch>
                 </a:blipFill>
               </p:spPr>
@@ -4119,10 +4395,10 @@
       </p:grpSp>
       <p:grpSp>
         <p:nvGrpSpPr>
-          <p:cNvPr id="51" name="Group 50">
-            <a:extLst>
-              <a:ext uri="{FF2B5EF4-FFF2-40B4-BE49-F238E27FC236}">
-                <a16:creationId xmlns:a16="http://schemas.microsoft.com/office/drawing/2014/main" id="{4B0A7A1F-B05B-208C-0178-B7EFD52DC1CF}"/>
+          <p:cNvPr id="4" name="Group 3">
+            <a:extLst>
+              <a:ext uri="{FF2B5EF4-FFF2-40B4-BE49-F238E27FC236}">
+                <a16:creationId xmlns:a16="http://schemas.microsoft.com/office/drawing/2014/main" id="{21F160A3-E31C-974B-29BC-CC25B2955E6D}"/>
               </a:ext>
             </a:extLst>
           </p:cNvPr>
@@ -4185,7 +4461,7 @@
             <a:lstStyle/>
             <a:p>
               <a:pPr algn="ctr"/>
-              <a:endParaRPr lang="en-US"/>
+              <a:endParaRPr lang="en-US" sz="2400"/>
             </a:p>
           </p:txBody>
         </p:sp>
@@ -4205,8 +4481,8 @@
               </p:nvSpPr>
               <p:spPr>
                 <a:xfrm>
-                  <a:off x="7604663" y="2738434"/>
-                  <a:ext cx="200696" cy="276999"/>
+                  <a:off x="7571449" y="2692267"/>
+                  <a:ext cx="267124" cy="369332"/>
                 </a:xfrm>
                 <a:prstGeom prst="rect">
                   <a:avLst/>
@@ -4219,6 +4495,7 @@
                 </a:bodyPr>
                 <a:lstStyle/>
                 <a:p>
+                  <a:pPr/>
                   <a14:m>
                     <m:oMathPara xmlns:m="http://schemas.openxmlformats.org/officeDocument/2006/math">
                       <m:oMathParaPr>
@@ -4226,7 +4503,7 @@
                       </m:oMathParaPr>
                       <m:oMath xmlns:m="http://schemas.openxmlformats.org/officeDocument/2006/math">
                         <m:r>
-                          <a:rPr lang="en-AU" b="0" i="1" smtClean="0">
+                          <a:rPr lang="en-AU" sz="2400" b="0" i="1" smtClean="0">
                             <a:latin typeface="Cambria Math" panose="02040503050406030204" pitchFamily="18" charset="0"/>
                           </a:rPr>
                           <m:t>𝑅</m:t>
@@ -4234,7 +4511,7 @@
                       </m:oMath>
                     </m:oMathPara>
                   </a14:m>
-                  <a:endParaRPr lang="en-US" dirty="0"/>
+                  <a:endParaRPr lang="en-US" sz="2400" dirty="0"/>
                 </a:p>
               </p:txBody>
             </p:sp>
@@ -4256,8 +4533,8 @@
               </p:nvSpPr>
               <p:spPr>
                 <a:xfrm>
-                  <a:off x="7604663" y="2738434"/>
-                  <a:ext cx="200696" cy="276999"/>
+                  <a:off x="7571449" y="2692267"/>
+                  <a:ext cx="267124" cy="369332"/>
                 </a:xfrm>
                 <a:prstGeom prst="rect">
                   <a:avLst/>
@@ -4265,7 +4542,7 @@
                 <a:blipFill>
                   <a:blip r:embed="rId4"/>
                   <a:stretch>
-                    <a:fillRect l="-27273" r="-27273" b="-6522"/>
+                    <a:fillRect l="-27273" r="-25000" b="-5000"/>
                   </a:stretch>
                 </a:blipFill>
               </p:spPr>
@@ -4287,10 +4564,10 @@
       </p:grpSp>
       <p:grpSp>
         <p:nvGrpSpPr>
-          <p:cNvPr id="54" name="Group 53">
-            <a:extLst>
-              <a:ext uri="{FF2B5EF4-FFF2-40B4-BE49-F238E27FC236}">
-                <a16:creationId xmlns:a16="http://schemas.microsoft.com/office/drawing/2014/main" id="{63CF0BCD-7E37-E1FC-8F84-5E11F5A1A9DC}"/>
+          <p:cNvPr id="5" name="Group 4">
+            <a:extLst>
+              <a:ext uri="{FF2B5EF4-FFF2-40B4-BE49-F238E27FC236}">
+                <a16:creationId xmlns:a16="http://schemas.microsoft.com/office/drawing/2014/main" id="{EFA9D866-409B-1CBB-E707-95A4D13ED264}"/>
               </a:ext>
             </a:extLst>
           </p:cNvPr>
@@ -4353,7 +4630,7 @@
             <a:lstStyle/>
             <a:p>
               <a:pPr algn="ctr"/>
-              <a:endParaRPr lang="en-US"/>
+              <a:endParaRPr lang="en-US" sz="2400"/>
             </a:p>
           </p:txBody>
         </p:sp>
@@ -4373,8 +4650,8 @@
               </p:nvSpPr>
               <p:spPr>
                 <a:xfrm>
-                  <a:off x="10376488" y="2738434"/>
-                  <a:ext cx="228460" cy="276999"/>
+                  <a:off x="10338657" y="2692267"/>
+                  <a:ext cx="304122" cy="369332"/>
                 </a:xfrm>
                 <a:prstGeom prst="rect">
                   <a:avLst/>
@@ -4387,6 +4664,7 @@
                 </a:bodyPr>
                 <a:lstStyle/>
                 <a:p>
+                  <a:pPr/>
                   <a14:m>
                     <m:oMathPara xmlns:m="http://schemas.openxmlformats.org/officeDocument/2006/math">
                       <m:oMathParaPr>
@@ -4396,14 +4674,14 @@
                         <m:sSub>
                           <m:sSubPr>
                             <m:ctrlPr>
-                              <a:rPr lang="en-AU" b="0" i="1" smtClean="0">
+                              <a:rPr lang="en-AU" sz="2400" b="0" i="1" smtClean="0">
                                 <a:latin typeface="Cambria Math" panose="02040503050406030204" pitchFamily="18" charset="0"/>
                               </a:rPr>
                             </m:ctrlPr>
                           </m:sSubPr>
                           <m:e>
                             <m:r>
-                              <a:rPr lang="en-AU" b="0" i="1" smtClean="0">
+                              <a:rPr lang="en-AU" sz="2400" b="0" i="1" smtClean="0">
                                 <a:latin typeface="Cambria Math" panose="02040503050406030204" pitchFamily="18" charset="0"/>
                               </a:rPr>
                               <m:t>𝐼</m:t>
@@ -4411,7 +4689,7 @@
                           </m:e>
                           <m:sub>
                             <m:r>
-                              <a:rPr lang="en-AU" b="0" i="1" smtClean="0">
+                              <a:rPr lang="en-AU" sz="2400" b="0" i="1" smtClean="0">
                                 <a:latin typeface="Cambria Math" panose="02040503050406030204" pitchFamily="18" charset="0"/>
                               </a:rPr>
                               <m:t>2</m:t>
@@ -4421,7 +4699,7 @@
                       </m:oMath>
                     </m:oMathPara>
                   </a14:m>
-                  <a:endParaRPr lang="en-US" dirty="0"/>
+                  <a:endParaRPr lang="en-US" sz="2400" dirty="0"/>
                 </a:p>
               </p:txBody>
             </p:sp>
@@ -4443,8 +4721,8 @@
               </p:nvSpPr>
               <p:spPr>
                 <a:xfrm>
-                  <a:off x="10376488" y="2738434"/>
-                  <a:ext cx="228460" cy="276999"/>
+                  <a:off x="10338657" y="2692267"/>
+                  <a:ext cx="304122" cy="369332"/>
                 </a:xfrm>
                 <a:prstGeom prst="rect">
                   <a:avLst/>
@@ -4452,7 +4730,7 @@
                 <a:blipFill>
                   <a:blip r:embed="rId5"/>
                   <a:stretch>
-                    <a:fillRect l="-23684" r="-10526" b="-15217"/>
+                    <a:fillRect l="-26000" r="-8000" b="-13333"/>
                   </a:stretch>
                 </a:blipFill>
               </p:spPr>
@@ -4488,8 +4766,8 @@
             </p:nvSpPr>
             <p:spPr>
               <a:xfrm>
-                <a:off x="4642917" y="1070043"/>
-                <a:ext cx="565476" cy="567271"/>
+                <a:off x="4541510" y="958075"/>
+                <a:ext cx="755591" cy="756297"/>
               </a:xfrm>
               <a:prstGeom prst="rect">
                 <a:avLst/>
@@ -4502,6 +4780,7 @@
               </a:bodyPr>
               <a:lstStyle/>
               <a:p>
+                <a:pPr/>
                 <a14:m>
                   <m:oMathPara xmlns:m="http://schemas.openxmlformats.org/officeDocument/2006/math">
                     <m:oMathParaPr>
@@ -4511,14 +4790,14 @@
                       <m:f>
                         <m:fPr>
                           <m:ctrlPr>
-                            <a:rPr lang="en-AU" b="0" i="1" smtClean="0">
+                            <a:rPr lang="en-AU" sz="2400" b="0" i="1" smtClean="0">
                               <a:latin typeface="Cambria Math" panose="02040503050406030204" pitchFamily="18" charset="0"/>
                             </a:rPr>
                           </m:ctrlPr>
                         </m:fPr>
                         <m:num>
                           <m:r>
-                            <a:rPr lang="en-AU" b="0" i="1" smtClean="0">
+                            <a:rPr lang="en-AU" sz="2400" b="0" i="1" smtClean="0">
                               <a:latin typeface="Cambria Math" panose="02040503050406030204" pitchFamily="18" charset="0"/>
                             </a:rPr>
                             <m:t>1</m:t>
@@ -4528,14 +4807,14 @@
                           <m:sSub>
                             <m:sSubPr>
                               <m:ctrlPr>
-                                <a:rPr lang="en-AU" b="0" i="1" smtClean="0">
+                                <a:rPr lang="en-AU" sz="2400" b="0" i="1" smtClean="0">
                                   <a:latin typeface="Cambria Math" panose="02040503050406030204" pitchFamily="18" charset="0"/>
                                 </a:rPr>
                               </m:ctrlPr>
                             </m:sSubPr>
                             <m:e>
                               <m:r>
-                                <a:rPr lang="en-AU" b="0" i="1" smtClean="0">
+                                <a:rPr lang="en-AU" sz="2400" b="0" i="1" smtClean="0">
                                   <a:latin typeface="Cambria Math" panose="02040503050406030204" pitchFamily="18" charset="0"/>
                                 </a:rPr>
                                 <m:t>𝑑</m:t>
@@ -4543,7 +4822,7 @@
                             </m:e>
                             <m:sub>
                               <m:r>
-                                <a:rPr lang="en-AU" b="0" i="1" smtClean="0">
+                                <a:rPr lang="en-AU" sz="2400" b="0" i="1" smtClean="0">
                                   <a:latin typeface="Cambria Math" panose="02040503050406030204" pitchFamily="18" charset="0"/>
                                 </a:rPr>
                                 <m:t>𝑖𝑚𝑚</m:t>
@@ -4555,7 +4834,7 @@
                     </m:oMath>
                   </m:oMathPara>
                 </a14:m>
-                <a:endParaRPr lang="en-US" dirty="0"/>
+                <a:endParaRPr lang="en-US" sz="2400" dirty="0"/>
               </a:p>
             </p:txBody>
           </p:sp>
@@ -4577,8 +4856,8 @@
             </p:nvSpPr>
             <p:spPr>
               <a:xfrm>
-                <a:off x="4642917" y="1070043"/>
-                <a:ext cx="565476" cy="567271"/>
+                <a:off x="4541510" y="958075"/>
+                <a:ext cx="755591" cy="756297"/>
               </a:xfrm>
               <a:prstGeom prst="rect">
                 <a:avLst/>
@@ -4621,8 +4900,8 @@
             </p:nvSpPr>
             <p:spPr>
               <a:xfrm>
-                <a:off x="3441108" y="2599934"/>
-                <a:ext cx="170688" cy="276999"/>
+                <a:off x="3441107" y="2507601"/>
+                <a:ext cx="226472" cy="369332"/>
               </a:xfrm>
               <a:prstGeom prst="rect">
                 <a:avLst/>
@@ -4635,6 +4914,7 @@
               </a:bodyPr>
               <a:lstStyle/>
               <a:p>
+                <a:pPr/>
                 <a14:m>
                   <m:oMathPara xmlns:m="http://schemas.openxmlformats.org/officeDocument/2006/math">
                     <m:oMathParaPr>
@@ -4642,7 +4922,7 @@
                     </m:oMathParaPr>
                     <m:oMath xmlns:m="http://schemas.openxmlformats.org/officeDocument/2006/math">
                       <m:r>
-                        <a:rPr lang="en-AU" b="0" i="1" smtClean="0">
+                        <a:rPr lang="en-AU" sz="2400" b="0" i="1" smtClean="0">
                           <a:latin typeface="Cambria Math" panose="02040503050406030204" pitchFamily="18" charset="0"/>
                         </a:rPr>
                         <m:t>𝜆</m:t>
@@ -4650,7 +4930,7 @@
                     </m:oMath>
                   </m:oMathPara>
                 </a14:m>
-                <a:endParaRPr lang="en-US" dirty="0"/>
+                <a:endParaRPr lang="en-US" sz="2400" dirty="0"/>
               </a:p>
             </p:txBody>
           </p:sp>
@@ -4672,8 +4952,8 @@
             </p:nvSpPr>
             <p:spPr>
               <a:xfrm>
-                <a:off x="3441108" y="2599934"/>
-                <a:ext cx="170688" cy="276999"/>
+                <a:off x="3441107" y="2507601"/>
+                <a:ext cx="226472" cy="369332"/>
               </a:xfrm>
               <a:prstGeom prst="rect">
                 <a:avLst/>
@@ -4681,7 +4961,7 @@
               <a:blipFill>
                 <a:blip r:embed="rId7"/>
                 <a:stretch>
-                  <a:fillRect l="-35714" r="-35714" b="-6522"/>
+                  <a:fillRect l="-34211" r="-28947" b="-4918"/>
                 </a:stretch>
               </a:blipFill>
             </p:spPr>
@@ -4716,8 +4996,8 @@
             </p:nvSpPr>
             <p:spPr>
               <a:xfrm>
-                <a:off x="8959493" y="2155049"/>
-                <a:ext cx="282065" cy="276999"/>
+                <a:off x="8956737" y="2075416"/>
+                <a:ext cx="376642" cy="369332"/>
               </a:xfrm>
               <a:prstGeom prst="rect">
                 <a:avLst/>
@@ -4730,6 +5010,7 @@
               </a:bodyPr>
               <a:lstStyle/>
               <a:p>
+                <a:pPr/>
                 <a14:m>
                   <m:oMathPara xmlns:m="http://schemas.openxmlformats.org/officeDocument/2006/math">
                     <m:oMathParaPr>
@@ -4739,14 +5020,14 @@
                       <m:sSub>
                         <m:sSubPr>
                           <m:ctrlPr>
-                            <a:rPr lang="en-AU" b="0" i="1" smtClean="0">
+                            <a:rPr lang="en-AU" sz="2400" b="0" i="1" smtClean="0">
                               <a:latin typeface="Cambria Math" panose="02040503050406030204" pitchFamily="18" charset="0"/>
                             </a:rPr>
                           </m:ctrlPr>
                         </m:sSubPr>
                         <m:e>
                           <m:r>
-                            <a:rPr lang="en-AU" b="0" i="1" smtClean="0">
+                            <a:rPr lang="en-AU" sz="2400" b="0" i="1" smtClean="0">
                               <a:latin typeface="Cambria Math" panose="02040503050406030204" pitchFamily="18" charset="0"/>
                             </a:rPr>
                             <m:t>𝑎</m:t>
@@ -4754,7 +5035,7 @@
                         </m:e>
                         <m:sub>
                           <m:r>
-                            <a:rPr lang="en-AU" b="0" i="1" smtClean="0">
+                            <a:rPr lang="en-AU" sz="2400" b="0" i="1" smtClean="0">
                               <a:latin typeface="Cambria Math" panose="02040503050406030204" pitchFamily="18" charset="0"/>
                             </a:rPr>
                             <m:t>2</m:t>
@@ -4764,7 +5045,7 @@
                     </m:oMath>
                   </m:oMathPara>
                 </a14:m>
-                <a:endParaRPr lang="en-US" dirty="0"/>
+                <a:endParaRPr lang="en-US" sz="2400" dirty="0"/>
               </a:p>
             </p:txBody>
           </p:sp>
@@ -4786,8 +5067,8 @@
             </p:nvSpPr>
             <p:spPr>
               <a:xfrm>
-                <a:off x="8959493" y="2155049"/>
-                <a:ext cx="282065" cy="276999"/>
+                <a:off x="8956737" y="2075416"/>
+                <a:ext cx="376642" cy="369332"/>
               </a:xfrm>
               <a:prstGeom prst="rect">
                 <a:avLst/>
@@ -4795,7 +5076,7 @@
               <a:blipFill>
                 <a:blip r:embed="rId8"/>
                 <a:stretch>
-                  <a:fillRect l="-13043" r="-8696" b="-15556"/>
+                  <a:fillRect l="-11290" r="-6452" b="-11475"/>
                 </a:stretch>
               </a:blipFill>
             </p:spPr>
@@ -4830,8 +5111,8 @@
             </p:nvSpPr>
             <p:spPr>
               <a:xfrm>
-                <a:off x="6173787" y="2592855"/>
-                <a:ext cx="276742" cy="276999"/>
+                <a:off x="6187549" y="2507601"/>
+                <a:ext cx="369525" cy="369332"/>
               </a:xfrm>
               <a:prstGeom prst="rect">
                 <a:avLst/>
@@ -4844,6 +5125,7 @@
               </a:bodyPr>
               <a:lstStyle/>
               <a:p>
+                <a:pPr/>
                 <a14:m>
                   <m:oMathPara xmlns:m="http://schemas.openxmlformats.org/officeDocument/2006/math">
                     <m:oMathParaPr>
@@ -4853,14 +5135,14 @@
                       <m:sSub>
                         <m:sSubPr>
                           <m:ctrlPr>
-                            <a:rPr lang="en-AU" b="0" i="1" smtClean="0">
+                            <a:rPr lang="en-AU" sz="2400" b="0" i="1" smtClean="0">
                               <a:latin typeface="Cambria Math" panose="02040503050406030204" pitchFamily="18" charset="0"/>
                             </a:rPr>
                           </m:ctrlPr>
                         </m:sSubPr>
                         <m:e>
                           <m:r>
-                            <a:rPr lang="en-AU" b="0" i="1" smtClean="0">
+                            <a:rPr lang="en-AU" sz="2400" b="0" i="1" smtClean="0">
                               <a:latin typeface="Cambria Math" panose="02040503050406030204" pitchFamily="18" charset="0"/>
                             </a:rPr>
                             <m:t>𝑎</m:t>
@@ -4868,7 +5150,7 @@
                         </m:e>
                         <m:sub>
                           <m:r>
-                            <a:rPr lang="en-AU" b="0" i="1" smtClean="0">
+                            <a:rPr lang="en-AU" sz="2400" b="0" i="1" smtClean="0">
                               <a:latin typeface="Cambria Math" panose="02040503050406030204" pitchFamily="18" charset="0"/>
                             </a:rPr>
                             <m:t>1</m:t>
@@ -4878,7 +5160,7 @@
                     </m:oMath>
                   </m:oMathPara>
                 </a14:m>
-                <a:endParaRPr lang="en-US" dirty="0"/>
+                <a:endParaRPr lang="en-US" sz="2400" dirty="0"/>
               </a:p>
             </p:txBody>
           </p:sp>
@@ -4900,8 +5182,8 @@
             </p:nvSpPr>
             <p:spPr>
               <a:xfrm>
-                <a:off x="6173787" y="2592855"/>
-                <a:ext cx="276742" cy="276999"/>
+                <a:off x="6187549" y="2507601"/>
+                <a:ext cx="369525" cy="369332"/>
               </a:xfrm>
               <a:prstGeom prst="rect">
                 <a:avLst/>
@@ -4909,7 +5191,7 @@
               <a:blipFill>
                 <a:blip r:embed="rId9"/>
                 <a:stretch>
-                  <a:fillRect l="-13333" r="-8889" b="-15217"/>
+                  <a:fillRect l="-11475" r="-6557" b="-11475"/>
                 </a:stretch>
               </a:blipFill>
             </p:spPr>
@@ -4944,8 +5226,8 @@
             </p:nvSpPr>
             <p:spPr>
               <a:xfrm>
-                <a:off x="9012520" y="3023973"/>
-                <a:ext cx="170688" cy="276999"/>
+                <a:off x="9011763" y="2962187"/>
+                <a:ext cx="226472" cy="369332"/>
               </a:xfrm>
               <a:prstGeom prst="rect">
                 <a:avLst/>
@@ -4958,6 +5240,7 @@
               </a:bodyPr>
               <a:lstStyle/>
               <a:p>
+                <a:pPr/>
                 <a14:m>
                   <m:oMathPara xmlns:m="http://schemas.openxmlformats.org/officeDocument/2006/math">
                     <m:oMathParaPr>
@@ -4965,7 +5248,7 @@
                     </m:oMathParaPr>
                     <m:oMath xmlns:m="http://schemas.openxmlformats.org/officeDocument/2006/math">
                       <m:r>
-                        <a:rPr lang="en-AU" b="0" i="1" smtClean="0">
+                        <a:rPr lang="en-AU" sz="2400" b="0" i="1" smtClean="0">
                           <a:latin typeface="Cambria Math" panose="02040503050406030204" pitchFamily="18" charset="0"/>
                         </a:rPr>
                         <m:t>𝜆</m:t>
@@ -4973,7 +5256,7 @@
                     </m:oMath>
                   </m:oMathPara>
                 </a14:m>
-                <a:endParaRPr lang="en-US" dirty="0"/>
+                <a:endParaRPr lang="en-US" sz="2400" dirty="0"/>
               </a:p>
             </p:txBody>
           </p:sp>
@@ -4995,8 +5278,8 @@
             </p:nvSpPr>
             <p:spPr>
               <a:xfrm>
-                <a:off x="9012520" y="3023973"/>
-                <a:ext cx="170688" cy="276999"/>
+                <a:off x="9011763" y="2962187"/>
+                <a:ext cx="226472" cy="369332"/>
               </a:xfrm>
               <a:prstGeom prst="rect">
                 <a:avLst/>
@@ -5004,7 +5287,7 @@
               <a:blipFill>
                 <a:blip r:embed="rId10"/>
                 <a:stretch>
-                  <a:fillRect l="-35714" r="-35714" b="-8889"/>
+                  <a:fillRect l="-35135" r="-32432" b="-4918"/>
                 </a:stretch>
               </a:blipFill>
             </p:spPr>
@@ -5039,8 +5322,8 @@
             </p:nvSpPr>
             <p:spPr>
               <a:xfrm>
-                <a:off x="850641" y="2293548"/>
-                <a:ext cx="194797" cy="516745"/>
+                <a:off x="841511" y="2100231"/>
+                <a:ext cx="260777" cy="689035"/>
               </a:xfrm>
               <a:prstGeom prst="rect">
                 <a:avLst/>
@@ -5053,6 +5336,7 @@
               </a:bodyPr>
               <a:lstStyle/>
               <a:p>
+                <a:pPr/>
                 <a14:m>
                   <m:oMathPara xmlns:m="http://schemas.openxmlformats.org/officeDocument/2006/math">
                     <m:oMathParaPr>
@@ -5062,14 +5346,14 @@
                       <m:f>
                         <m:fPr>
                           <m:ctrlPr>
-                            <a:rPr lang="en-AU" b="0" i="1" smtClean="0">
+                            <a:rPr lang="en-AU" sz="2400" b="0" i="1" smtClean="0">
                               <a:latin typeface="Cambria Math" panose="02040503050406030204" pitchFamily="18" charset="0"/>
                             </a:rPr>
                           </m:ctrlPr>
                         </m:fPr>
                         <m:num>
                           <m:r>
-                            <a:rPr lang="en-AU" b="0" i="1" smtClean="0">
+                            <a:rPr lang="en-AU" sz="2400" b="0" i="1" smtClean="0">
                               <a:latin typeface="Cambria Math" panose="02040503050406030204" pitchFamily="18" charset="0"/>
                             </a:rPr>
                             <m:t>𝑃</m:t>
@@ -5077,7 +5361,7 @@
                         </m:num>
                         <m:den>
                           <m:r>
-                            <a:rPr lang="en-AU" b="0" i="1" smtClean="0">
+                            <a:rPr lang="en-AU" sz="2400" b="0" i="1" smtClean="0">
                               <a:latin typeface="Cambria Math" panose="02040503050406030204" pitchFamily="18" charset="0"/>
                             </a:rPr>
                             <m:t>𝐿</m:t>
@@ -5087,7 +5371,7 @@
                     </m:oMath>
                   </m:oMathPara>
                 </a14:m>
-                <a:endParaRPr lang="en-US" dirty="0"/>
+                <a:endParaRPr lang="en-US" sz="2400" dirty="0"/>
               </a:p>
             </p:txBody>
           </p:sp>
@@ -5109,8 +5393,8 @@
             </p:nvSpPr>
             <p:spPr>
               <a:xfrm>
-                <a:off x="850641" y="2293548"/>
-                <a:ext cx="194797" cy="516745"/>
+                <a:off x="841511" y="2100231"/>
+                <a:ext cx="260777" cy="689035"/>
               </a:xfrm>
               <a:prstGeom prst="rect">
                 <a:avLst/>
@@ -5154,7 +5438,7 @@
             <p:spPr>
               <a:xfrm>
                 <a:off x="2272501" y="3429000"/>
-                <a:ext cx="174727" cy="518604"/>
+                <a:ext cx="232436" cy="691471"/>
               </a:xfrm>
               <a:prstGeom prst="rect">
                 <a:avLst/>
@@ -5167,6 +5451,7 @@
               </a:bodyPr>
               <a:lstStyle/>
               <a:p>
+                <a:pPr/>
                 <a14:m>
                   <m:oMathPara xmlns:m="http://schemas.openxmlformats.org/officeDocument/2006/math">
                     <m:oMathParaPr>
@@ -5176,14 +5461,14 @@
                       <m:f>
                         <m:fPr>
                           <m:ctrlPr>
-                            <a:rPr lang="en-AU" b="0" i="1" smtClean="0">
+                            <a:rPr lang="en-AU" sz="2400" b="0" i="1" smtClean="0">
                               <a:latin typeface="Cambria Math" panose="02040503050406030204" pitchFamily="18" charset="0"/>
                             </a:rPr>
                           </m:ctrlPr>
                         </m:fPr>
                         <m:num>
                           <m:r>
-                            <a:rPr lang="en-AU" b="0" i="1" smtClean="0">
+                            <a:rPr lang="en-AU" sz="2400" b="0" i="1" smtClean="0">
                               <a:latin typeface="Cambria Math" panose="02040503050406030204" pitchFamily="18" charset="0"/>
                             </a:rPr>
                             <m:t>1</m:t>
@@ -5191,7 +5476,7 @@
                         </m:num>
                         <m:den>
                           <m:r>
-                            <a:rPr lang="en-AU" b="0" i="1" smtClean="0">
+                            <a:rPr lang="en-AU" sz="2400" b="0" i="1" smtClean="0">
                               <a:latin typeface="Cambria Math" panose="02040503050406030204" pitchFamily="18" charset="0"/>
                             </a:rPr>
                             <m:t>𝐿</m:t>
@@ -5201,7 +5486,7 @@
                     </m:oMath>
                   </m:oMathPara>
                 </a14:m>
-                <a:endParaRPr lang="en-US" dirty="0"/>
+                <a:endParaRPr lang="en-US" sz="2400" dirty="0"/>
               </a:p>
             </p:txBody>
           </p:sp>
@@ -5224,7 +5509,7 @@
             <p:spPr>
               <a:xfrm>
                 <a:off x="2272501" y="3429000"/>
-                <a:ext cx="174727" cy="518604"/>
+                <a:ext cx="232436" cy="691471"/>
               </a:xfrm>
               <a:prstGeom prst="rect">
                 <a:avLst/>
@@ -5268,7 +5553,7 @@
             <p:spPr>
               <a:xfrm>
                 <a:off x="5030874" y="3429000"/>
-                <a:ext cx="174727" cy="518604"/>
+                <a:ext cx="232436" cy="691471"/>
               </a:xfrm>
               <a:prstGeom prst="rect">
                 <a:avLst/>
@@ -5281,6 +5566,7 @@
               </a:bodyPr>
               <a:lstStyle/>
               <a:p>
+                <a:pPr/>
                 <a14:m>
                   <m:oMathPara xmlns:m="http://schemas.openxmlformats.org/officeDocument/2006/math">
                     <m:oMathParaPr>
@@ -5290,14 +5576,14 @@
                       <m:f>
                         <m:fPr>
                           <m:ctrlPr>
-                            <a:rPr lang="en-AU" b="0" i="1" smtClean="0">
+                            <a:rPr lang="en-AU" sz="2400" b="0" i="1" smtClean="0">
                               <a:latin typeface="Cambria Math" panose="02040503050406030204" pitchFamily="18" charset="0"/>
                             </a:rPr>
                           </m:ctrlPr>
                         </m:fPr>
                         <m:num>
                           <m:r>
-                            <a:rPr lang="en-AU" b="0" i="1" smtClean="0">
+                            <a:rPr lang="en-AU" sz="2400" b="0" i="1" smtClean="0">
                               <a:latin typeface="Cambria Math" panose="02040503050406030204" pitchFamily="18" charset="0"/>
                             </a:rPr>
                             <m:t>1</m:t>
@@ -5305,7 +5591,7 @@
                         </m:num>
                         <m:den>
                           <m:r>
-                            <a:rPr lang="en-AU" b="0" i="1" smtClean="0">
+                            <a:rPr lang="en-AU" sz="2400" b="0" i="1" smtClean="0">
                               <a:latin typeface="Cambria Math" panose="02040503050406030204" pitchFamily="18" charset="0"/>
                             </a:rPr>
                             <m:t>𝐿</m:t>
@@ -5315,7 +5601,7 @@
                     </m:oMath>
                   </m:oMathPara>
                 </a14:m>
-                <a:endParaRPr lang="en-US" dirty="0"/>
+                <a:endParaRPr lang="en-US" sz="2400" dirty="0"/>
               </a:p>
             </p:txBody>
           </p:sp>
@@ -5338,7 +5624,7 @@
             <p:spPr>
               <a:xfrm>
                 <a:off x="5030874" y="3429000"/>
-                <a:ext cx="174727" cy="518604"/>
+                <a:ext cx="232436" cy="691471"/>
               </a:xfrm>
               <a:prstGeom prst="rect">
                 <a:avLst/>
@@ -5382,7 +5668,7 @@
             <p:spPr>
               <a:xfrm>
                 <a:off x="7837692" y="3385565"/>
-                <a:ext cx="174727" cy="518604"/>
+                <a:ext cx="232436" cy="691471"/>
               </a:xfrm>
               <a:prstGeom prst="rect">
                 <a:avLst/>
@@ -5395,6 +5681,7 @@
               </a:bodyPr>
               <a:lstStyle/>
               <a:p>
+                <a:pPr/>
                 <a14:m>
                   <m:oMathPara xmlns:m="http://schemas.openxmlformats.org/officeDocument/2006/math">
                     <m:oMathParaPr>
@@ -5404,14 +5691,14 @@
                       <m:f>
                         <m:fPr>
                           <m:ctrlPr>
-                            <a:rPr lang="en-AU" b="0" i="1" smtClean="0">
+                            <a:rPr lang="en-AU" sz="2400" b="0" i="1" smtClean="0">
                               <a:latin typeface="Cambria Math" panose="02040503050406030204" pitchFamily="18" charset="0"/>
                             </a:rPr>
                           </m:ctrlPr>
                         </m:fPr>
                         <m:num>
                           <m:r>
-                            <a:rPr lang="en-AU" b="0" i="1" smtClean="0">
+                            <a:rPr lang="en-AU" sz="2400" b="0" i="1" smtClean="0">
                               <a:latin typeface="Cambria Math" panose="02040503050406030204" pitchFamily="18" charset="0"/>
                             </a:rPr>
                             <m:t>1</m:t>
@@ -5419,7 +5706,7 @@
                         </m:num>
                         <m:den>
                           <m:r>
-                            <a:rPr lang="en-AU" b="0" i="1" smtClean="0">
+                            <a:rPr lang="en-AU" sz="2400" b="0" i="1" smtClean="0">
                               <a:latin typeface="Cambria Math" panose="02040503050406030204" pitchFamily="18" charset="0"/>
                             </a:rPr>
                             <m:t>𝐿</m:t>
@@ -5429,7 +5716,7 @@
                     </m:oMath>
                   </m:oMathPara>
                 </a14:m>
-                <a:endParaRPr lang="en-US" dirty="0"/>
+                <a:endParaRPr lang="en-US" sz="2400" dirty="0"/>
               </a:p>
             </p:txBody>
           </p:sp>
@@ -5452,7 +5739,7 @@
             <p:spPr>
               <a:xfrm>
                 <a:off x="7837692" y="3385565"/>
-                <a:ext cx="174727" cy="518604"/>
+                <a:ext cx="232436" cy="691471"/>
               </a:xfrm>
               <a:prstGeom prst="rect">
                 <a:avLst/>
@@ -5496,7 +5783,7 @@
             <p:spPr>
               <a:xfrm>
                 <a:off x="10615104" y="3385565"/>
-                <a:ext cx="174727" cy="518604"/>
+                <a:ext cx="232436" cy="691471"/>
               </a:xfrm>
               <a:prstGeom prst="rect">
                 <a:avLst/>
@@ -5509,6 +5796,7 @@
               </a:bodyPr>
               <a:lstStyle/>
               <a:p>
+                <a:pPr/>
                 <a14:m>
                   <m:oMathPara xmlns:m="http://schemas.openxmlformats.org/officeDocument/2006/math">
                     <m:oMathParaPr>
@@ -5518,14 +5806,14 @@
                       <m:f>
                         <m:fPr>
                           <m:ctrlPr>
-                            <a:rPr lang="en-AU" b="0" i="1" smtClean="0">
+                            <a:rPr lang="en-AU" sz="2400" b="0" i="1" smtClean="0">
                               <a:latin typeface="Cambria Math" panose="02040503050406030204" pitchFamily="18" charset="0"/>
                             </a:rPr>
                           </m:ctrlPr>
                         </m:fPr>
                         <m:num>
                           <m:r>
-                            <a:rPr lang="en-AU" b="0" i="1" smtClean="0">
+                            <a:rPr lang="en-AU" sz="2400" b="0" i="1" smtClean="0">
                               <a:latin typeface="Cambria Math" panose="02040503050406030204" pitchFamily="18" charset="0"/>
                             </a:rPr>
                             <m:t>1</m:t>
@@ -5533,7 +5821,7 @@
                         </m:num>
                         <m:den>
                           <m:r>
-                            <a:rPr lang="en-AU" b="0" i="1" smtClean="0">
+                            <a:rPr lang="en-AU" sz="2400" b="0" i="1" smtClean="0">
                               <a:latin typeface="Cambria Math" panose="02040503050406030204" pitchFamily="18" charset="0"/>
                             </a:rPr>
                             <m:t>𝐿</m:t>
@@ -5543,7 +5831,7 @@
                     </m:oMath>
                   </m:oMathPara>
                 </a14:m>
-                <a:endParaRPr lang="en-US" dirty="0"/>
+                <a:endParaRPr lang="en-US" sz="2400" dirty="0"/>
               </a:p>
             </p:txBody>
           </p:sp>
@@ -5566,7 +5854,7 @@
             <p:spPr>
               <a:xfrm>
                 <a:off x="10615104" y="3385565"/>
-                <a:ext cx="174727" cy="518604"/>
+                <a:ext cx="232436" cy="691471"/>
               </a:xfrm>
               <a:prstGeom prst="rect">
                 <a:avLst/>
@@ -5597,6 +5885,104 @@
     <p:extLst>
       <p:ext uri="{BB962C8B-B14F-4D97-AF65-F5344CB8AC3E}">
         <p14:creationId xmlns:p14="http://schemas.microsoft.com/office/powerpoint/2010/main" val="3991404153"/>
+      </p:ext>
+    </p:extLst>
+  </p:cSld>
+  <p:clrMapOvr>
+    <a:masterClrMapping/>
+  </p:clrMapOvr>
+</p:sld>
+</file>
+
+<file path=ppt/slides/slide2.xml><?xml version="1.0" encoding="utf-8"?>
+<p:sld xmlns:a="http://schemas.openxmlformats.org/drawingml/2006/main" xmlns:r="http://schemas.openxmlformats.org/officeDocument/2006/relationships" xmlns:p="http://schemas.openxmlformats.org/presentationml/2006/main">
+  <p:cSld>
+    <p:spTree>
+      <p:nvGrpSpPr>
+        <p:cNvPr id="1" name=""/>
+        <p:cNvGrpSpPr/>
+        <p:nvPr/>
+      </p:nvGrpSpPr>
+      <p:grpSpPr>
+        <a:xfrm>
+          <a:off x="0" y="0"/>
+          <a:ext cx="0" cy="0"/>
+          <a:chOff x="0" y="0"/>
+          <a:chExt cx="0" cy="0"/>
+        </a:xfrm>
+      </p:grpSpPr>
+      <p:pic>
+        <p:nvPicPr>
+          <p:cNvPr id="3" name="Picture 2" descr="A diagram of a normal distribution&#10;&#10;AI-generated content may be incorrect.">
+            <a:extLst>
+              <a:ext uri="{FF2B5EF4-FFF2-40B4-BE49-F238E27FC236}">
+                <a16:creationId xmlns:a16="http://schemas.microsoft.com/office/drawing/2014/main" id="{0F7ABE44-E086-7705-2A18-E146CFEB987D}"/>
+              </a:ext>
+            </a:extLst>
+          </p:cNvPr>
+          <p:cNvPicPr>
+            <a:picLocks noChangeAspect="1"/>
+          </p:cNvPicPr>
+          <p:nvPr/>
+        </p:nvPicPr>
+        <p:blipFill>
+          <a:blip r:embed="rId2">
+            <a:extLst>
+              <a:ext uri="{28A0092B-C50C-407E-A947-70E740481C1C}">
+                <a14:useLocalDpi xmlns:a14="http://schemas.microsoft.com/office/drawing/2010/main" val="0"/>
+              </a:ext>
+            </a:extLst>
+          </a:blip>
+          <a:stretch>
+            <a:fillRect/>
+          </a:stretch>
+        </p:blipFill>
+        <p:spPr>
+          <a:xfrm>
+            <a:off x="1738859" y="974272"/>
+            <a:ext cx="9725214" cy="5478993"/>
+          </a:xfrm>
+          <a:prstGeom prst="rect">
+            <a:avLst/>
+          </a:prstGeom>
+        </p:spPr>
+      </p:pic>
+      <p:sp>
+        <p:nvSpPr>
+          <p:cNvPr id="4" name="TextBox 3">
+            <a:extLst>
+              <a:ext uri="{FF2B5EF4-FFF2-40B4-BE49-F238E27FC236}">
+                <a16:creationId xmlns:a16="http://schemas.microsoft.com/office/drawing/2014/main" id="{50DFE4D2-2CA9-154A-CF97-79E7B53F5FDC}"/>
+              </a:ext>
+            </a:extLst>
+          </p:cNvPr>
+          <p:cNvSpPr txBox="1"/>
+          <p:nvPr/>
+        </p:nvSpPr>
+        <p:spPr>
+          <a:xfrm>
+            <a:off x="1530220" y="974272"/>
+            <a:ext cx="184731" cy="369332"/>
+          </a:xfrm>
+          <a:prstGeom prst="rect">
+            <a:avLst/>
+          </a:prstGeom>
+          <a:noFill/>
+        </p:spPr>
+        <p:txBody>
+          <a:bodyPr wrap="none" rtlCol="0">
+            <a:spAutoFit/>
+          </a:bodyPr>
+          <a:lstStyle/>
+          <a:p>
+            <a:endParaRPr lang="en-US"/>
+          </a:p>
+        </p:txBody>
+      </p:sp>
+    </p:spTree>
+    <p:extLst>
+      <p:ext uri="{BB962C8B-B14F-4D97-AF65-F5344CB8AC3E}">
+        <p14:creationId xmlns:p14="http://schemas.microsoft.com/office/powerpoint/2010/main" val="2685355263"/>
       </p:ext>
     </p:extLst>
   </p:cSld>

</xml_diff>